<commit_message>
Made text update for Scott Renner
</commit_message>
<xml_diff>
--- a/day 3/1245 NIEM Technical Specifications.pptx
+++ b/day 3/1245 NIEM Technical Specifications.pptx
@@ -134,6 +134,9 @@
         </p15:guide>
       </p15:sldGuideLst>
     </p:ext>
+    <p:ext uri="{2D200454-40CA-4A62-9FC3-DE9A4176ACB9}">
+      <p15:notesGuideLst xmlns:p15="http://schemas.microsoft.com/office/powerpoint/2012/main"/>
+    </p:ext>
   </p:extLst>
 </p:presentation>
 </file>
@@ -1877,10 +1880,10 @@
       </p:sp>
       <p:sp>
         <p:nvSpPr>
-          <p:cNvPr id="8" name="Content Placeholder 7">
+          <p:cNvPr id="3" name="Content Placeholder 2">
             <a:extLst>
               <a:ext uri="{FF2B5EF4-FFF2-40B4-BE49-F238E27FC236}">
-                <a16:creationId xmlns:a16="http://schemas.microsoft.com/office/drawing/2014/main" id="{C81E7FF4-51EB-AE41-BDC0-E5672FC6B8E5}"/>
+                <a16:creationId xmlns:a16="http://schemas.microsoft.com/office/drawing/2014/main" id="{F393D34F-1752-6C47-B71F-496F80901B25}"/>
               </a:ext>
             </a:extLst>
           </p:cNvPr>
@@ -1893,8 +1896,8 @@
         </p:nvSpPr>
         <p:spPr>
           <a:xfrm>
-            <a:off x="628650" y="1008063"/>
-            <a:ext cx="7886700" cy="5207000"/>
+            <a:off x="514350" y="514350"/>
+            <a:ext cx="8143875" cy="5715000"/>
           </a:xfrm>
         </p:spPr>
         <p:txBody>
@@ -2209,8 +2212,8 @@
         </p:nvSpPr>
         <p:spPr>
           <a:xfrm>
-            <a:off x="628650" y="883403"/>
-            <a:ext cx="7886700" cy="5293560"/>
+            <a:off x="628650" y="514350"/>
+            <a:ext cx="7886700" cy="5736417"/>
           </a:xfrm>
           <a:prstGeom prst="rect">
             <a:avLst/>
@@ -2919,6 +2922,36 @@
       </p:grpSpPr>
       <p:sp>
         <p:nvSpPr>
+          <p:cNvPr id="4" name="Slide Number Placeholder 3">
+            <a:extLst>
+              <a:ext uri="{FF2B5EF4-FFF2-40B4-BE49-F238E27FC236}">
+                <a16:creationId xmlns:a16="http://schemas.microsoft.com/office/drawing/2014/main" id="{B500A741-ACFF-B04D-8CA5-724FD1281670}"/>
+              </a:ext>
+            </a:extLst>
+          </p:cNvPr>
+          <p:cNvSpPr>
+            <a:spLocks noGrp="1"/>
+          </p:cNvSpPr>
+          <p:nvPr>
+            <p:ph type="sldNum" sz="quarter" idx="4"/>
+          </p:nvPr>
+        </p:nvSpPr>
+        <p:spPr/>
+        <p:txBody>
+          <a:bodyPr/>
+          <a:lstStyle/>
+          <a:p>
+            <a:fld id="{DE814A3B-586F-6741-A578-6A3C03C31D10}" type="slidenum">
+              <a:rPr lang="en-US" smtClean="0"/>
+              <a:pPr/>
+              <a:t>2</a:t>
+            </a:fld>
+            <a:endParaRPr lang="en-US" dirty="0"/>
+          </a:p>
+        </p:txBody>
+      </p:sp>
+      <p:sp>
+        <p:nvSpPr>
           <p:cNvPr id="5" name="Title 4">
             <a:extLst>
               <a:ext uri="{FF2B5EF4-FFF2-40B4-BE49-F238E27FC236}">
@@ -2933,12 +2966,7 @@
             <p:ph type="title"/>
           </p:nvPr>
         </p:nvSpPr>
-        <p:spPr>
-          <a:xfrm>
-            <a:off x="457200" y="388275"/>
-            <a:ext cx="8089900" cy="811358"/>
-          </a:xfrm>
-        </p:spPr>
+        <p:spPr/>
         <p:txBody>
           <a:bodyPr/>
           <a:lstStyle/>
@@ -2947,36 +2975,6 @@
               <a:rPr lang="en-US"/>
               <a:t>Overview</a:t>
             </a:r>
-          </a:p>
-        </p:txBody>
-      </p:sp>
-      <p:sp>
-        <p:nvSpPr>
-          <p:cNvPr id="4" name="Slide Number Placeholder 3">
-            <a:extLst>
-              <a:ext uri="{FF2B5EF4-FFF2-40B4-BE49-F238E27FC236}">
-                <a16:creationId xmlns:a16="http://schemas.microsoft.com/office/drawing/2014/main" id="{B500A741-ACFF-B04D-8CA5-724FD1281670}"/>
-              </a:ext>
-            </a:extLst>
-          </p:cNvPr>
-          <p:cNvSpPr>
-            <a:spLocks noGrp="1"/>
-          </p:cNvSpPr>
-          <p:nvPr>
-            <p:ph type="sldNum" sz="quarter" idx="4"/>
-          </p:nvPr>
-        </p:nvSpPr>
-        <p:spPr/>
-        <p:txBody>
-          <a:bodyPr/>
-          <a:lstStyle/>
-          <a:p>
-            <a:fld id="{DE814A3B-586F-6741-A578-6A3C03C31D10}" type="slidenum">
-              <a:rPr lang="en-US" smtClean="0"/>
-              <a:pPr/>
-              <a:t>2</a:t>
-            </a:fld>
-            <a:endParaRPr lang="en-US" dirty="0"/>
           </a:p>
         </p:txBody>
       </p:sp>
@@ -3328,6 +3326,10 @@
           <a:lstStyle/>
           <a:p>
             <a:pPr lvl="0"/>
+            <a:endParaRPr lang="en-US" sz="2000"/>
+          </a:p>
+          <a:p>
+            <a:pPr lvl="0"/>
             <a:r>
               <a:rPr lang="en-US" sz="2000"/>
               <a:t>Defines a conformance target:</a:t>
@@ -3445,6 +3447,36 @@
       </p:grpSpPr>
       <p:sp>
         <p:nvSpPr>
+          <p:cNvPr id="3" name="Slide Number Placeholder 2">
+            <a:extLst>
+              <a:ext uri="{FF2B5EF4-FFF2-40B4-BE49-F238E27FC236}">
+                <a16:creationId xmlns:a16="http://schemas.microsoft.com/office/drawing/2014/main" id="{7A5FF5D3-3B78-2F45-8E29-FADD89183943}"/>
+              </a:ext>
+            </a:extLst>
+          </p:cNvPr>
+          <p:cNvSpPr>
+            <a:spLocks noGrp="1"/>
+          </p:cNvSpPr>
+          <p:nvPr>
+            <p:ph type="sldNum" sz="quarter" idx="4"/>
+          </p:nvPr>
+        </p:nvSpPr>
+        <p:spPr/>
+        <p:txBody>
+          <a:bodyPr/>
+          <a:lstStyle/>
+          <a:p>
+            <a:fld id="{DE814A3B-586F-6741-A578-6A3C03C31D10}" type="slidenum">
+              <a:rPr lang="en-US" smtClean="0"/>
+              <a:pPr/>
+              <a:t>5</a:t>
+            </a:fld>
+            <a:endParaRPr lang="en-US" dirty="0"/>
+          </a:p>
+        </p:txBody>
+      </p:sp>
+      <p:sp>
+        <p:nvSpPr>
           <p:cNvPr id="2" name="Title 1">
             <a:extLst>
               <a:ext uri="{FF2B5EF4-FFF2-40B4-BE49-F238E27FC236}">
@@ -3459,12 +3491,7 @@
             <p:ph type="title"/>
           </p:nvPr>
         </p:nvSpPr>
-        <p:spPr>
-          <a:xfrm>
-            <a:off x="457200" y="388275"/>
-            <a:ext cx="8089900" cy="811358"/>
-          </a:xfrm>
-        </p:spPr>
+        <p:spPr/>
         <p:txBody>
           <a:bodyPr/>
           <a:lstStyle/>
@@ -3473,36 +3500,6 @@
               <a:rPr lang="en-US"/>
               <a:t>NIEM Naming and Design Rules</a:t>
             </a:r>
-          </a:p>
-        </p:txBody>
-      </p:sp>
-      <p:sp>
-        <p:nvSpPr>
-          <p:cNvPr id="3" name="Slide Number Placeholder 2">
-            <a:extLst>
-              <a:ext uri="{FF2B5EF4-FFF2-40B4-BE49-F238E27FC236}">
-                <a16:creationId xmlns:a16="http://schemas.microsoft.com/office/drawing/2014/main" id="{7A5FF5D3-3B78-2F45-8E29-FADD89183943}"/>
-              </a:ext>
-            </a:extLst>
-          </p:cNvPr>
-          <p:cNvSpPr>
-            <a:spLocks noGrp="1"/>
-          </p:cNvSpPr>
-          <p:nvPr>
-            <p:ph type="sldNum" sz="quarter" idx="4"/>
-          </p:nvPr>
-        </p:nvSpPr>
-        <p:spPr/>
-        <p:txBody>
-          <a:bodyPr/>
-          <a:lstStyle/>
-          <a:p>
-            <a:fld id="{DE814A3B-586F-6741-A578-6A3C03C31D10}" type="slidenum">
-              <a:rPr lang="en-US" smtClean="0"/>
-              <a:pPr/>
-              <a:t>5</a:t>
-            </a:fld>
-            <a:endParaRPr lang="en-US" dirty="0"/>
           </a:p>
         </p:txBody>
       </p:sp>
@@ -3625,6 +3622,36 @@
       </p:grpSpPr>
       <p:sp>
         <p:nvSpPr>
+          <p:cNvPr id="3" name="Slide Number Placeholder 2">
+            <a:extLst>
+              <a:ext uri="{FF2B5EF4-FFF2-40B4-BE49-F238E27FC236}">
+                <a16:creationId xmlns:a16="http://schemas.microsoft.com/office/drawing/2014/main" id="{1CAE01F8-BF1E-FC45-B5E0-C213A7108E53}"/>
+              </a:ext>
+            </a:extLst>
+          </p:cNvPr>
+          <p:cNvSpPr>
+            <a:spLocks noGrp="1"/>
+          </p:cNvSpPr>
+          <p:nvPr>
+            <p:ph type="sldNum" sz="quarter" idx="4"/>
+          </p:nvPr>
+        </p:nvSpPr>
+        <p:spPr/>
+        <p:txBody>
+          <a:bodyPr/>
+          <a:lstStyle/>
+          <a:p>
+            <a:fld id="{DE814A3B-586F-6741-A578-6A3C03C31D10}" type="slidenum">
+              <a:rPr lang="en-US" smtClean="0"/>
+              <a:pPr/>
+              <a:t>6</a:t>
+            </a:fld>
+            <a:endParaRPr lang="en-US" dirty="0"/>
+          </a:p>
+        </p:txBody>
+      </p:sp>
+      <p:sp>
+        <p:nvSpPr>
           <p:cNvPr id="2" name="Title 1">
             <a:extLst>
               <a:ext uri="{FF2B5EF4-FFF2-40B4-BE49-F238E27FC236}">
@@ -3639,12 +3666,7 @@
             <p:ph type="title"/>
           </p:nvPr>
         </p:nvSpPr>
-        <p:spPr>
-          <a:xfrm>
-            <a:off x="457200" y="388275"/>
-            <a:ext cx="8089900" cy="811358"/>
-          </a:xfrm>
-        </p:spPr>
+        <p:spPr/>
         <p:txBody>
           <a:bodyPr/>
           <a:lstStyle/>
@@ -3658,36 +3680,6 @@
               <a:t> Package Description Specification</a:t>
             </a:r>
             <a:endParaRPr lang="en-US"/>
-          </a:p>
-        </p:txBody>
-      </p:sp>
-      <p:sp>
-        <p:nvSpPr>
-          <p:cNvPr id="3" name="Slide Number Placeholder 2">
-            <a:extLst>
-              <a:ext uri="{FF2B5EF4-FFF2-40B4-BE49-F238E27FC236}">
-                <a16:creationId xmlns:a16="http://schemas.microsoft.com/office/drawing/2014/main" id="{1CAE01F8-BF1E-FC45-B5E0-C213A7108E53}"/>
-              </a:ext>
-            </a:extLst>
-          </p:cNvPr>
-          <p:cNvSpPr>
-            <a:spLocks noGrp="1"/>
-          </p:cNvSpPr>
-          <p:nvPr>
-            <p:ph type="sldNum" sz="quarter" idx="4"/>
-          </p:nvPr>
-        </p:nvSpPr>
-        <p:spPr/>
-        <p:txBody>
-          <a:bodyPr/>
-          <a:lstStyle/>
-          <a:p>
-            <a:fld id="{DE814A3B-586F-6741-A578-6A3C03C31D10}" type="slidenum">
-              <a:rPr lang="en-US" smtClean="0"/>
-              <a:pPr/>
-              <a:t>6</a:t>
-            </a:fld>
-            <a:endParaRPr lang="en-US" dirty="0"/>
           </a:p>
         </p:txBody>
       </p:sp>
@@ -3764,7 +3756,7 @@
           <a:p>
             <a:r>
               <a:rPr lang="en-US"/>
-              <a:t>Update for NIEM 5.0 is recommended.</a:t>
+              <a:t>Recommend replacement with a new, simpler NIEM Message Description Specification for NIEM 5.0.</a:t>
             </a:r>
           </a:p>
         </p:txBody>
@@ -3801,6 +3793,36 @@
       </p:grpSpPr>
       <p:sp>
         <p:nvSpPr>
+          <p:cNvPr id="3" name="Slide Number Placeholder 2">
+            <a:extLst>
+              <a:ext uri="{FF2B5EF4-FFF2-40B4-BE49-F238E27FC236}">
+                <a16:creationId xmlns:a16="http://schemas.microsoft.com/office/drawing/2014/main" id="{61B19ECD-D7A1-7C4F-A00C-B41854023674}"/>
+              </a:ext>
+            </a:extLst>
+          </p:cNvPr>
+          <p:cNvSpPr>
+            <a:spLocks noGrp="1"/>
+          </p:cNvSpPr>
+          <p:nvPr>
+            <p:ph type="sldNum" sz="quarter" idx="4"/>
+          </p:nvPr>
+        </p:nvSpPr>
+        <p:spPr/>
+        <p:txBody>
+          <a:bodyPr/>
+          <a:lstStyle/>
+          <a:p>
+            <a:fld id="{DE814A3B-586F-6741-A578-6A3C03C31D10}" type="slidenum">
+              <a:rPr lang="en-US" smtClean="0"/>
+              <a:pPr/>
+              <a:t>7</a:t>
+            </a:fld>
+            <a:endParaRPr lang="en-US" dirty="0"/>
+          </a:p>
+        </p:txBody>
+      </p:sp>
+      <p:sp>
+        <p:nvSpPr>
           <p:cNvPr id="2" name="Title 1">
             <a:extLst>
               <a:ext uri="{FF2B5EF4-FFF2-40B4-BE49-F238E27FC236}">
@@ -3815,12 +3837,7 @@
             <p:ph type="title"/>
           </p:nvPr>
         </p:nvSpPr>
-        <p:spPr>
-          <a:xfrm>
-            <a:off x="457200" y="388275"/>
-            <a:ext cx="8089900" cy="811358"/>
-          </a:xfrm>
-        </p:spPr>
+        <p:spPr/>
         <p:txBody>
           <a:bodyPr/>
           <a:lstStyle/>
@@ -3829,36 +3846,6 @@
               <a:rPr lang="en-US"/>
               <a:t>NIEM Schematron in XML Schema Documents Specification</a:t>
             </a:r>
-          </a:p>
-        </p:txBody>
-      </p:sp>
-      <p:sp>
-        <p:nvSpPr>
-          <p:cNvPr id="3" name="Slide Number Placeholder 2">
-            <a:extLst>
-              <a:ext uri="{FF2B5EF4-FFF2-40B4-BE49-F238E27FC236}">
-                <a16:creationId xmlns:a16="http://schemas.microsoft.com/office/drawing/2014/main" id="{61B19ECD-D7A1-7C4F-A00C-B41854023674}"/>
-              </a:ext>
-            </a:extLst>
-          </p:cNvPr>
-          <p:cNvSpPr>
-            <a:spLocks noGrp="1"/>
-          </p:cNvSpPr>
-          <p:nvPr>
-            <p:ph type="sldNum" sz="quarter" idx="4"/>
-          </p:nvPr>
-        </p:nvSpPr>
-        <p:spPr/>
-        <p:txBody>
-          <a:bodyPr/>
-          <a:lstStyle/>
-          <a:p>
-            <a:fld id="{DE814A3B-586F-6741-A578-6A3C03C31D10}" type="slidenum">
-              <a:rPr lang="en-US" smtClean="0"/>
-              <a:pPr/>
-              <a:t>7</a:t>
-            </a:fld>
-            <a:endParaRPr lang="en-US" dirty="0"/>
           </a:p>
         </p:txBody>
       </p:sp>
@@ -3956,6 +3943,36 @@
       </p:grpSpPr>
       <p:sp>
         <p:nvSpPr>
+          <p:cNvPr id="3" name="Slide Number Placeholder 2">
+            <a:extLst>
+              <a:ext uri="{FF2B5EF4-FFF2-40B4-BE49-F238E27FC236}">
+                <a16:creationId xmlns:a16="http://schemas.microsoft.com/office/drawing/2014/main" id="{FE504873-68D4-F741-91E9-3A63D760D8DD}"/>
+              </a:ext>
+            </a:extLst>
+          </p:cNvPr>
+          <p:cNvSpPr>
+            <a:spLocks noGrp="1"/>
+          </p:cNvSpPr>
+          <p:nvPr>
+            <p:ph type="sldNum" sz="quarter" idx="4"/>
+          </p:nvPr>
+        </p:nvSpPr>
+        <p:spPr/>
+        <p:txBody>
+          <a:bodyPr/>
+          <a:lstStyle/>
+          <a:p>
+            <a:fld id="{DE814A3B-586F-6741-A578-6A3C03C31D10}" type="slidenum">
+              <a:rPr lang="en-US" smtClean="0"/>
+              <a:pPr/>
+              <a:t>8</a:t>
+            </a:fld>
+            <a:endParaRPr lang="en-US" dirty="0"/>
+          </a:p>
+        </p:txBody>
+      </p:sp>
+      <p:sp>
+        <p:nvSpPr>
           <p:cNvPr id="2" name="Title 1">
             <a:extLst>
               <a:ext uri="{FF2B5EF4-FFF2-40B4-BE49-F238E27FC236}">
@@ -3970,12 +3987,7 @@
             <p:ph type="title"/>
           </p:nvPr>
         </p:nvSpPr>
-        <p:spPr>
-          <a:xfrm>
-            <a:off x="457200" y="388275"/>
-            <a:ext cx="8089900" cy="811358"/>
-          </a:xfrm>
-        </p:spPr>
+        <p:spPr/>
         <p:txBody>
           <a:bodyPr/>
           <a:lstStyle/>
@@ -3989,36 +4001,6 @@
               <a:t> JSON Specification</a:t>
             </a:r>
             <a:endParaRPr lang="en-US"/>
-          </a:p>
-        </p:txBody>
-      </p:sp>
-      <p:sp>
-        <p:nvSpPr>
-          <p:cNvPr id="3" name="Slide Number Placeholder 2">
-            <a:extLst>
-              <a:ext uri="{FF2B5EF4-FFF2-40B4-BE49-F238E27FC236}">
-                <a16:creationId xmlns:a16="http://schemas.microsoft.com/office/drawing/2014/main" id="{FE504873-68D4-F741-91E9-3A63D760D8DD}"/>
-              </a:ext>
-            </a:extLst>
-          </p:cNvPr>
-          <p:cNvSpPr>
-            <a:spLocks noGrp="1"/>
-          </p:cNvSpPr>
-          <p:nvPr>
-            <p:ph type="sldNum" sz="quarter" idx="4"/>
-          </p:nvPr>
-        </p:nvSpPr>
-        <p:spPr/>
-        <p:txBody>
-          <a:bodyPr/>
-          <a:lstStyle/>
-          <a:p>
-            <a:fld id="{DE814A3B-586F-6741-A578-6A3C03C31D10}" type="slidenum">
-              <a:rPr lang="en-US" smtClean="0"/>
-              <a:pPr/>
-              <a:t>8</a:t>
-            </a:fld>
-            <a:endParaRPr lang="en-US" dirty="0"/>
           </a:p>
         </p:txBody>
       </p:sp>
@@ -4142,6 +4124,36 @@
       </p:grpSpPr>
       <p:sp>
         <p:nvSpPr>
+          <p:cNvPr id="3" name="Slide Number Placeholder 2">
+            <a:extLst>
+              <a:ext uri="{FF2B5EF4-FFF2-40B4-BE49-F238E27FC236}">
+                <a16:creationId xmlns:a16="http://schemas.microsoft.com/office/drawing/2014/main" id="{831BBF45-F2DE-0C49-8509-F003771AF860}"/>
+              </a:ext>
+            </a:extLst>
+          </p:cNvPr>
+          <p:cNvSpPr>
+            <a:spLocks noGrp="1"/>
+          </p:cNvSpPr>
+          <p:nvPr>
+            <p:ph type="sldNum" sz="quarter" idx="4"/>
+          </p:nvPr>
+        </p:nvSpPr>
+        <p:spPr/>
+        <p:txBody>
+          <a:bodyPr/>
+          <a:lstStyle/>
+          <a:p>
+            <a:fld id="{DE814A3B-586F-6741-A578-6A3C03C31D10}" type="slidenum">
+              <a:rPr lang="en-US" smtClean="0"/>
+              <a:pPr/>
+              <a:t>9</a:t>
+            </a:fld>
+            <a:endParaRPr lang="en-US" dirty="0"/>
+          </a:p>
+        </p:txBody>
+      </p:sp>
+      <p:sp>
+        <p:nvSpPr>
           <p:cNvPr id="2" name="Title 1">
             <a:extLst>
               <a:ext uri="{FF2B5EF4-FFF2-40B4-BE49-F238E27FC236}">
@@ -4156,12 +4168,7 @@
             <p:ph type="title"/>
           </p:nvPr>
         </p:nvSpPr>
-        <p:spPr>
-          <a:xfrm>
-            <a:off x="457200" y="388275"/>
-            <a:ext cx="8089900" cy="811358"/>
-          </a:xfrm>
-        </p:spPr>
+        <p:spPr/>
         <p:txBody>
           <a:bodyPr/>
           <a:lstStyle/>
@@ -4170,36 +4177,6 @@
               <a:rPr lang="en-US"/>
               <a:t>NIEM Metamodel</a:t>
             </a:r>
-          </a:p>
-        </p:txBody>
-      </p:sp>
-      <p:sp>
-        <p:nvSpPr>
-          <p:cNvPr id="3" name="Slide Number Placeholder 2">
-            <a:extLst>
-              <a:ext uri="{FF2B5EF4-FFF2-40B4-BE49-F238E27FC236}">
-                <a16:creationId xmlns:a16="http://schemas.microsoft.com/office/drawing/2014/main" id="{831BBF45-F2DE-0C49-8509-F003771AF860}"/>
-              </a:ext>
-            </a:extLst>
-          </p:cNvPr>
-          <p:cNvSpPr>
-            <a:spLocks noGrp="1"/>
-          </p:cNvSpPr>
-          <p:nvPr>
-            <p:ph type="sldNum" sz="quarter" idx="4"/>
-          </p:nvPr>
-        </p:nvSpPr>
-        <p:spPr/>
-        <p:txBody>
-          <a:bodyPr/>
-          <a:lstStyle/>
-          <a:p>
-            <a:fld id="{DE814A3B-586F-6741-A578-6A3C03C31D10}" type="slidenum">
-              <a:rPr lang="en-US" smtClean="0"/>
-              <a:pPr/>
-              <a:t>9</a:t>
-            </a:fld>
-            <a:endParaRPr lang="en-US" dirty="0"/>
           </a:p>
         </p:txBody>
       </p:sp>

</xml_diff>

<commit_message>
Added code list specification.
</commit_message>
<xml_diff>
--- a/day 3/1245 NIEM Technical Specifications.pptx
+++ b/day 3/1245 NIEM Technical Specifications.pptx
@@ -5,10 +5,10 @@
     <p:sldMasterId id="2147483685" r:id="rId1"/>
   </p:sldMasterIdLst>
   <p:notesMasterIdLst>
-    <p:notesMasterId r:id="rId12"/>
+    <p:notesMasterId r:id="rId13"/>
   </p:notesMasterIdLst>
   <p:handoutMasterIdLst>
-    <p:handoutMasterId r:id="rId13"/>
+    <p:handoutMasterId r:id="rId14"/>
   </p:handoutMasterIdLst>
   <p:sldIdLst>
     <p:sldId id="282" r:id="rId2"/>
@@ -17,10 +17,11 @@
     <p:sldId id="291" r:id="rId5"/>
     <p:sldId id="285" r:id="rId6"/>
     <p:sldId id="286" r:id="rId7"/>
-    <p:sldId id="287" r:id="rId8"/>
+    <p:sldId id="289" r:id="rId8"/>
     <p:sldId id="288" r:id="rId9"/>
-    <p:sldId id="289" r:id="rId10"/>
+    <p:sldId id="292" r:id="rId10"/>
     <p:sldId id="290" r:id="rId11"/>
+    <p:sldId id="287" r:id="rId12"/>
   </p:sldIdLst>
   <p:sldSz cx="9144000" cy="6858000" type="screen4x3"/>
   <p:notesSz cx="7010400" cy="9236075"/>
@@ -223,7 +224,7 @@
           <a:p>
             <a:fld id="{49554897-4719-C84D-8751-3F55E7198742}" type="datetimeFigureOut">
               <a:rPr lang="en-US" smtClean="0"/>
-              <a:t>10/22/19</a:t>
+              <a:t>10/23/19</a:t>
             </a:fld>
             <a:endParaRPr lang="en-US"/>
           </a:p>
@@ -389,7 +390,7 @@
           <a:p>
             <a:fld id="{2E0F2886-C27D-804E-BE8F-D80D5D98A370}" type="datetimeFigureOut">
               <a:rPr lang="en-US" smtClean="0"/>
-              <a:t>10/22/19</a:t>
+              <a:t>10/23/19</a:t>
             </a:fld>
             <a:endParaRPr lang="en-US"/>
           </a:p>
@@ -825,6 +826,90 @@
 </p:notes>
 </file>
 
+<file path=ppt/notesSlides/notesSlide11.xml><?xml version="1.0" encoding="utf-8"?>
+<p:notes xmlns:a="http://schemas.openxmlformats.org/drawingml/2006/main" xmlns:r="http://schemas.openxmlformats.org/officeDocument/2006/relationships" xmlns:p="http://schemas.openxmlformats.org/presentationml/2006/main">
+  <p:cSld>
+    <p:spTree>
+      <p:nvGrpSpPr>
+        <p:cNvPr id="1" name=""/>
+        <p:cNvGrpSpPr/>
+        <p:nvPr/>
+      </p:nvGrpSpPr>
+      <p:grpSpPr>
+        <a:xfrm>
+          <a:off x="0" y="0"/>
+          <a:ext cx="0" cy="0"/>
+          <a:chOff x="0" y="0"/>
+          <a:chExt cx="0" cy="0"/>
+        </a:xfrm>
+      </p:grpSpPr>
+      <p:sp>
+        <p:nvSpPr>
+          <p:cNvPr id="2" name="Slide Image Placeholder 1"/>
+          <p:cNvSpPr>
+            <a:spLocks noGrp="1" noRot="1" noChangeAspect="1"/>
+          </p:cNvSpPr>
+          <p:nvPr>
+            <p:ph type="sldImg"/>
+          </p:nvPr>
+        </p:nvSpPr>
+        <p:spPr/>
+      </p:sp>
+      <p:sp>
+        <p:nvSpPr>
+          <p:cNvPr id="3" name="Notes Placeholder 2"/>
+          <p:cNvSpPr>
+            <a:spLocks noGrp="1"/>
+          </p:cNvSpPr>
+          <p:nvPr>
+            <p:ph type="body" idx="1"/>
+          </p:nvPr>
+        </p:nvSpPr>
+        <p:spPr/>
+        <p:txBody>
+          <a:bodyPr/>
+          <a:lstStyle/>
+          <a:p>
+            <a:endParaRPr lang="en-US"/>
+          </a:p>
+        </p:txBody>
+      </p:sp>
+      <p:sp>
+        <p:nvSpPr>
+          <p:cNvPr id="4" name="Slide Number Placeholder 3"/>
+          <p:cNvSpPr>
+            <a:spLocks noGrp="1"/>
+          </p:cNvSpPr>
+          <p:nvPr>
+            <p:ph type="sldNum" sz="quarter" idx="5"/>
+          </p:nvPr>
+        </p:nvSpPr>
+        <p:spPr/>
+        <p:txBody>
+          <a:bodyPr/>
+          <a:lstStyle/>
+          <a:p>
+            <a:fld id="{0B22E215-D3C6-D84F-8ECF-5127C8518219}" type="slidenum">
+              <a:rPr lang="en-US" smtClean="0"/>
+              <a:t>11</a:t>
+            </a:fld>
+            <a:endParaRPr lang="en-US"/>
+          </a:p>
+        </p:txBody>
+      </p:sp>
+    </p:spTree>
+    <p:extLst>
+      <p:ext uri="{BB962C8B-B14F-4D97-AF65-F5344CB8AC3E}">
+        <p14:creationId xmlns:p14="http://schemas.microsoft.com/office/powerpoint/2010/main" val="2245044596"/>
+      </p:ext>
+    </p:extLst>
+  </p:cSld>
+  <p:clrMapOvr>
+    <a:masterClrMapping/>
+  </p:clrMapOvr>
+</p:notes>
+</file>
+
 <file path=ppt/notesSlides/notesSlide2.xml><?xml version="1.0" encoding="utf-8"?>
 <p:notes xmlns:a="http://schemas.openxmlformats.org/drawingml/2006/main" xmlns:r="http://schemas.openxmlformats.org/officeDocument/2006/relationships" xmlns:p="http://schemas.openxmlformats.org/presentationml/2006/main">
   <p:cSld>
@@ -1319,7 +1404,7 @@
     </p:spTree>
     <p:extLst>
       <p:ext uri="{BB962C8B-B14F-4D97-AF65-F5344CB8AC3E}">
-        <p14:creationId xmlns:p14="http://schemas.microsoft.com/office/powerpoint/2010/main" val="2245044596"/>
+        <p14:creationId xmlns:p14="http://schemas.microsoft.com/office/powerpoint/2010/main" val="2949163705"/>
       </p:ext>
     </p:extLst>
   </p:cSld>
@@ -1487,7 +1572,7 @@
     </p:spTree>
     <p:extLst>
       <p:ext uri="{BB962C8B-B14F-4D97-AF65-F5344CB8AC3E}">
-        <p14:creationId xmlns:p14="http://schemas.microsoft.com/office/powerpoint/2010/main" val="2949163705"/>
+        <p14:creationId xmlns:p14="http://schemas.microsoft.com/office/powerpoint/2010/main" val="1675817954"/>
       </p:ext>
     </p:extLst>
   </p:cSld>
@@ -2903,6 +2988,156 @@
 </p:sld>
 </file>
 
+<file path=ppt/slides/slide11.xml><?xml version="1.0" encoding="utf-8"?>
+<p:sld xmlns:a="http://schemas.openxmlformats.org/drawingml/2006/main" xmlns:r="http://schemas.openxmlformats.org/officeDocument/2006/relationships" xmlns:p="http://schemas.openxmlformats.org/presentationml/2006/main">
+  <p:cSld>
+    <p:spTree>
+      <p:nvGrpSpPr>
+        <p:cNvPr id="1" name=""/>
+        <p:cNvGrpSpPr/>
+        <p:nvPr/>
+      </p:nvGrpSpPr>
+      <p:grpSpPr>
+        <a:xfrm>
+          <a:off x="0" y="0"/>
+          <a:ext cx="0" cy="0"/>
+          <a:chOff x="0" y="0"/>
+          <a:chExt cx="0" cy="0"/>
+        </a:xfrm>
+      </p:grpSpPr>
+      <p:sp>
+        <p:nvSpPr>
+          <p:cNvPr id="3" name="Slide Number Placeholder 2">
+            <a:extLst>
+              <a:ext uri="{FF2B5EF4-FFF2-40B4-BE49-F238E27FC236}">
+                <a16:creationId xmlns:a16="http://schemas.microsoft.com/office/drawing/2014/main" id="{61B19ECD-D7A1-7C4F-A00C-B41854023674}"/>
+              </a:ext>
+            </a:extLst>
+          </p:cNvPr>
+          <p:cNvSpPr>
+            <a:spLocks noGrp="1"/>
+          </p:cNvSpPr>
+          <p:nvPr>
+            <p:ph type="sldNum" sz="quarter" idx="4"/>
+          </p:nvPr>
+        </p:nvSpPr>
+        <p:spPr/>
+        <p:txBody>
+          <a:bodyPr/>
+          <a:lstStyle/>
+          <a:p>
+            <a:fld id="{DE814A3B-586F-6741-A578-6A3C03C31D10}" type="slidenum">
+              <a:rPr lang="en-US" smtClean="0"/>
+              <a:pPr/>
+              <a:t>11</a:t>
+            </a:fld>
+            <a:endParaRPr lang="en-US" dirty="0"/>
+          </a:p>
+        </p:txBody>
+      </p:sp>
+      <p:sp>
+        <p:nvSpPr>
+          <p:cNvPr id="2" name="Title 1">
+            <a:extLst>
+              <a:ext uri="{FF2B5EF4-FFF2-40B4-BE49-F238E27FC236}">
+                <a16:creationId xmlns:a16="http://schemas.microsoft.com/office/drawing/2014/main" id="{40B3C0D8-4CA1-D546-B3EE-278348B91FB2}"/>
+              </a:ext>
+            </a:extLst>
+          </p:cNvPr>
+          <p:cNvSpPr>
+            <a:spLocks noGrp="1"/>
+          </p:cNvSpPr>
+          <p:nvPr>
+            <p:ph type="title"/>
+          </p:nvPr>
+        </p:nvSpPr>
+        <p:spPr/>
+        <p:txBody>
+          <a:bodyPr/>
+          <a:lstStyle/>
+          <a:p>
+            <a:r>
+              <a:rPr lang="en-US"/>
+              <a:t>NIEM Schematron in XML Schema Documents Specification</a:t>
+            </a:r>
+          </a:p>
+        </p:txBody>
+      </p:sp>
+      <p:sp>
+        <p:nvSpPr>
+          <p:cNvPr id="4" name="Content Placeholder 3">
+            <a:extLst>
+              <a:ext uri="{FF2B5EF4-FFF2-40B4-BE49-F238E27FC236}">
+                <a16:creationId xmlns:a16="http://schemas.microsoft.com/office/drawing/2014/main" id="{6D5ECEF0-F528-4C4A-BD7E-8D56E4C34D74}"/>
+              </a:ext>
+            </a:extLst>
+          </p:cNvPr>
+          <p:cNvSpPr>
+            <a:spLocks noGrp="1"/>
+          </p:cNvSpPr>
+          <p:nvPr>
+            <p:ph sz="quarter" idx="10"/>
+          </p:nvPr>
+        </p:nvSpPr>
+        <p:spPr/>
+        <p:txBody>
+          <a:bodyPr/>
+          <a:lstStyle/>
+          <a:p>
+            <a:pPr lvl="0"/>
+            <a:r>
+              <a:rPr lang="en-US"/>
+              <a:t>Schematron</a:t>
+            </a:r>
+            <a:r>
+              <a:rPr lang="en-US" baseline="0"/>
+              <a:t> is a rules language for XML, which enables validation more </a:t>
+            </a:r>
+            <a:endParaRPr lang="en-US"/>
+          </a:p>
+          <a:p>
+            <a:pPr lvl="0"/>
+            <a:r>
+              <a:rPr lang="en-US"/>
+              <a:t>Defines how to embed rules in an XML Schema document to make them more useful</a:t>
+            </a:r>
+          </a:p>
+          <a:p>
+            <a:pPr lvl="0"/>
+            <a:r>
+              <a:rPr lang="en-US"/>
+              <a:t>Draft version 1.0alpha4. </a:t>
+            </a:r>
+            <a:r>
+              <a:rPr lang="en-US">
+                <a:hlinkClick r:id="rId3"/>
+              </a:rPr>
+              <a:t>[link]</a:t>
+            </a:r>
+            <a:endParaRPr lang="en-US"/>
+          </a:p>
+          <a:p>
+            <a:pPr lvl="0"/>
+            <a:r>
+              <a:rPr lang="en-US"/>
+              <a:t>Future of this specification is uncertain</a:t>
+            </a:r>
+          </a:p>
+        </p:txBody>
+      </p:sp>
+    </p:spTree>
+    <p:extLst>
+      <p:ext uri="{BB962C8B-B14F-4D97-AF65-F5344CB8AC3E}">
+        <p14:creationId xmlns:p14="http://schemas.microsoft.com/office/powerpoint/2010/main" val="3215554872"/>
+      </p:ext>
+    </p:extLst>
+  </p:cSld>
+  <p:clrMapOvr>
+    <a:masterClrMapping/>
+  </p:clrMapOvr>
+</p:sld>
+</file>
+
 <file path=ppt/slides/slide2.xml><?xml version="1.0" encoding="utf-8"?>
 <p:sld xmlns:a="http://schemas.openxmlformats.org/drawingml/2006/main" xmlns:r="http://schemas.openxmlformats.org/officeDocument/2006/relationships" xmlns:p="http://schemas.openxmlformats.org/presentationml/2006/main">
   <p:cSld>
@@ -3796,7 +4031,7 @@
           <p:cNvPr id="3" name="Slide Number Placeholder 2">
             <a:extLst>
               <a:ext uri="{FF2B5EF4-FFF2-40B4-BE49-F238E27FC236}">
-                <a16:creationId xmlns:a16="http://schemas.microsoft.com/office/drawing/2014/main" id="{61B19ECD-D7A1-7C4F-A00C-B41854023674}"/>
+                <a16:creationId xmlns:a16="http://schemas.microsoft.com/office/drawing/2014/main" id="{831BBF45-F2DE-0C49-8509-F003771AF860}"/>
               </a:ext>
             </a:extLst>
           </p:cNvPr>
@@ -3826,7 +4061,7 @@
           <p:cNvPr id="2" name="Title 1">
             <a:extLst>
               <a:ext uri="{FF2B5EF4-FFF2-40B4-BE49-F238E27FC236}">
-                <a16:creationId xmlns:a16="http://schemas.microsoft.com/office/drawing/2014/main" id="{40B3C0D8-4CA1-D546-B3EE-278348B91FB2}"/>
+                <a16:creationId xmlns:a16="http://schemas.microsoft.com/office/drawing/2014/main" id="{64534895-E5B7-B44E-877C-67E05A254E7B}"/>
               </a:ext>
             </a:extLst>
           </p:cNvPr>
@@ -3844,7 +4079,7 @@
           <a:p>
             <a:r>
               <a:rPr lang="en-US"/>
-              <a:t>NIEM Schematron in XML Schema Documents Specification</a:t>
+              <a:t>NIEM Metamodel</a:t>
             </a:r>
           </a:p>
         </p:txBody>
@@ -3854,7 +4089,7 @@
           <p:cNvPr id="4" name="Content Placeholder 3">
             <a:extLst>
               <a:ext uri="{FF2B5EF4-FFF2-40B4-BE49-F238E27FC236}">
-                <a16:creationId xmlns:a16="http://schemas.microsoft.com/office/drawing/2014/main" id="{6D5ECEF0-F528-4C4A-BD7E-8D56E4C34D74}"/>
+                <a16:creationId xmlns:a16="http://schemas.microsoft.com/office/drawing/2014/main" id="{FEEE0B6C-729C-854B-AC3F-8E4203E69186}"/>
               </a:ext>
             </a:extLst>
           </p:cNvPr>
@@ -3870,29 +4105,71 @@
           <a:bodyPr/>
           <a:lstStyle/>
           <a:p>
+            <a:r>
+              <a:rPr lang="en-US"/>
+              <a:t>Defines NIEM data models</a:t>
+            </a:r>
+            <a:r>
+              <a:rPr lang="en-US" baseline="0"/>
+              <a:t>, as data objects</a:t>
+            </a:r>
+          </a:p>
+          <a:p>
+            <a:pPr lvl="1"/>
+            <a:r>
+              <a:rPr lang="en-US"/>
+              <a:t>Instead</a:t>
+            </a:r>
+            <a:r>
+              <a:rPr lang="en-US" baseline="0"/>
+              <a:t> of XML Schema, JSON Schema, UML</a:t>
+            </a:r>
+          </a:p>
+          <a:p>
             <a:pPr lvl="0"/>
             <a:r>
-              <a:rPr lang="en-US"/>
-              <a:t>Schematron</a:t>
-            </a:r>
-            <a:r>
               <a:rPr lang="en-US" baseline="0"/>
-              <a:t> is a rules language for XML, which enables validation more </a:t>
-            </a:r>
-            <a:endParaRPr lang="en-US"/>
+              <a:t>Provides a critical interoperability need</a:t>
+            </a:r>
+          </a:p>
+          <a:p>
+            <a:pPr lvl="1"/>
+            <a:r>
+              <a:rPr lang="en-US" baseline="0"/>
+              <a:t>To support a NIEM tool architecture</a:t>
+            </a:r>
+          </a:p>
+          <a:p>
+            <a:pPr lvl="2"/>
+            <a:r>
+              <a:rPr lang="en-US" baseline="0"/>
+              <a:t>JSON via JSON Schema, UML</a:t>
+            </a:r>
           </a:p>
           <a:p>
             <a:pPr lvl="0"/>
             <a:r>
               <a:rPr lang="en-US"/>
-              <a:t>Defines how to embed rules in an XML Schema document to make them more useful</a:t>
-            </a:r>
-          </a:p>
-          <a:p>
-            <a:pPr lvl="0"/>
-            <a:r>
-              <a:rPr lang="en-US"/>
-              <a:t>Draft version 1.0alpha4. </a:t>
+              <a:t>Drafted as a set of tools,</a:t>
+            </a:r>
+            <a:r>
+              <a:rPr lang="en-US" baseline="0"/>
+              <a:t> </a:t>
+            </a:r>
+            <a:r>
+              <a:rPr lang="en-US"/>
+              <a:t>schemas, and</a:t>
+            </a:r>
+            <a:r>
+              <a:rPr lang="en-US" baseline="0"/>
+              <a:t> data</a:t>
+            </a:r>
+          </a:p>
+          <a:p>
+            <a:pPr lvl="1"/>
+            <a:r>
+              <a:rPr lang="en-US"/>
+              <a:t>Under development, on GitHub </a:t>
             </a:r>
             <a:r>
               <a:rPr lang="en-US">
@@ -3900,13 +4177,21 @@
               </a:rPr>
               <a:t>[link]</a:t>
             </a:r>
-            <a:endParaRPr lang="en-US"/>
+            <a:endParaRPr lang="en-US" baseline="0"/>
           </a:p>
           <a:p>
             <a:pPr lvl="0"/>
             <a:r>
               <a:rPr lang="en-US"/>
-              <a:t>Future of this specification is uncertain</a:t>
+              <a:t>Formalization as a specification recommended</a:t>
+            </a:r>
+            <a:r>
+              <a:rPr lang="en-US" baseline="0"/>
+              <a:t> after</a:t>
+            </a:r>
+            <a:r>
+              <a:rPr lang="en-US"/>
+              <a:t> NIEM 5.0</a:t>
             </a:r>
           </a:p>
         </p:txBody>
@@ -3914,7 +4199,7 @@
     </p:spTree>
     <p:extLst>
       <p:ext uri="{BB962C8B-B14F-4D97-AF65-F5344CB8AC3E}">
-        <p14:creationId xmlns:p14="http://schemas.microsoft.com/office/powerpoint/2010/main" val="3215554872"/>
+        <p14:creationId xmlns:p14="http://schemas.microsoft.com/office/powerpoint/2010/main" val="2635748564"/>
       </p:ext>
     </p:extLst>
   </p:cSld>
@@ -4127,7 +4412,7 @@
           <p:cNvPr id="3" name="Slide Number Placeholder 2">
             <a:extLst>
               <a:ext uri="{FF2B5EF4-FFF2-40B4-BE49-F238E27FC236}">
-                <a16:creationId xmlns:a16="http://schemas.microsoft.com/office/drawing/2014/main" id="{831BBF45-F2DE-0C49-8509-F003771AF860}"/>
+                <a16:creationId xmlns:a16="http://schemas.microsoft.com/office/drawing/2014/main" id="{61B19ECD-D7A1-7C4F-A00C-B41854023674}"/>
               </a:ext>
             </a:extLst>
           </p:cNvPr>
@@ -4157,7 +4442,7 @@
           <p:cNvPr id="2" name="Title 1">
             <a:extLst>
               <a:ext uri="{FF2B5EF4-FFF2-40B4-BE49-F238E27FC236}">
-                <a16:creationId xmlns:a16="http://schemas.microsoft.com/office/drawing/2014/main" id="{64534895-E5B7-B44E-877C-67E05A254E7B}"/>
+                <a16:creationId xmlns:a16="http://schemas.microsoft.com/office/drawing/2014/main" id="{40B3C0D8-4CA1-D546-B3EE-278348B91FB2}"/>
               </a:ext>
             </a:extLst>
           </p:cNvPr>
@@ -4175,8 +4460,13 @@
           <a:p>
             <a:r>
               <a:rPr lang="en-US"/>
-              <a:t>NIEM Metamodel</a:t>
-            </a:r>
+              <a:t>NIEM</a:t>
+            </a:r>
+            <a:r>
+              <a:rPr lang="en-US" baseline="0"/>
+              <a:t> Code Lists Specification</a:t>
+            </a:r>
+            <a:endParaRPr lang="en-US"/>
           </a:p>
         </p:txBody>
       </p:sp>
@@ -4185,7 +4475,7 @@
           <p:cNvPr id="4" name="Content Placeholder 3">
             <a:extLst>
               <a:ext uri="{FF2B5EF4-FFF2-40B4-BE49-F238E27FC236}">
-                <a16:creationId xmlns:a16="http://schemas.microsoft.com/office/drawing/2014/main" id="{FEEE0B6C-729C-854B-AC3F-8E4203E69186}"/>
+                <a16:creationId xmlns:a16="http://schemas.microsoft.com/office/drawing/2014/main" id="{6D5ECEF0-F528-4C4A-BD7E-8D56E4C34D74}"/>
               </a:ext>
             </a:extLst>
           </p:cNvPr>
@@ -4201,52 +4491,28 @@
           <a:bodyPr/>
           <a:lstStyle/>
           <a:p>
-            <a:r>
-              <a:rPr lang="en-US"/>
-              <a:t>Defines NIEM data models</a:t>
+            <a:pPr lvl="0"/>
+            <a:r>
+              <a:rPr lang="en-US"/>
+              <a:t>Defines how to define and use code lists,</a:t>
             </a:r>
             <a:r>
               <a:rPr lang="en-US" baseline="0"/>
-              <a:t>, as data objects</a:t>
+              <a:t> managed separately from XML Schemas</a:t>
             </a:r>
           </a:p>
           <a:p>
             <a:pPr lvl="1"/>
             <a:r>
               <a:rPr lang="en-US"/>
-              <a:t>Instead</a:t>
-            </a:r>
-            <a:r>
-              <a:rPr lang="en-US" baseline="0"/>
-              <a:t> of XML Schema, JSON Schema, UML</a:t>
-            </a:r>
-          </a:p>
-          <a:p>
-            <a:pPr lvl="0"/>
-            <a:r>
-              <a:rPr lang="en-US" baseline="0"/>
-              <a:t>Provides a critical interoperability need</a:t>
+              <a:t>XML representation: Genericode</a:t>
             </a:r>
           </a:p>
           <a:p>
             <a:pPr lvl="1"/>
             <a:r>
-              <a:rPr lang="en-US" baseline="0"/>
-              <a:t>To support a NIEM tool architecture</a:t>
-            </a:r>
-          </a:p>
-          <a:p>
-            <a:pPr lvl="2"/>
-            <a:r>
-              <a:rPr lang="en-US" baseline="0"/>
-              <a:t>JSON via JSON Schema, UML</a:t>
-            </a:r>
-          </a:p>
-          <a:p>
-            <a:pPr lvl="0"/>
-            <a:r>
-              <a:rPr lang="en-US"/>
-              <a:t>Drafted as a set of tools,</a:t>
+              <a:rPr lang="en-US"/>
+              <a:t>Spreadsheet / table representation:</a:t>
             </a:r>
             <a:r>
               <a:rPr lang="en-US" baseline="0"/>
@@ -4254,18 +4520,25 @@
             </a:r>
             <a:r>
               <a:rPr lang="en-US"/>
-              <a:t>schemas, and</a:t>
+              <a:t>CSV</a:t>
+            </a:r>
+          </a:p>
+          <a:p>
+            <a:pPr lvl="0"/>
+            <a:r>
+              <a:rPr lang="en-US"/>
+              <a:t>Code lists can be updated and distributed and reused</a:t>
             </a:r>
             <a:r>
               <a:rPr lang="en-US" baseline="0"/>
-              <a:t> data</a:t>
-            </a:r>
-          </a:p>
-          <a:p>
-            <a:pPr lvl="1"/>
-            <a:r>
-              <a:rPr lang="en-US"/>
-              <a:t>Under development, on GitHub </a:t>
+              <a:t> without updating schemas or IEPDs</a:t>
+            </a:r>
+          </a:p>
+          <a:p>
+            <a:pPr lvl="0"/>
+            <a:r>
+              <a:rPr lang="en-US"/>
+              <a:t>Version 4.0. </a:t>
             </a:r>
             <a:r>
               <a:rPr lang="en-US">
@@ -4273,21 +4546,13 @@
               </a:rPr>
               <a:t>[link]</a:t>
             </a:r>
-            <a:endParaRPr lang="en-US" baseline="0"/>
+            <a:endParaRPr lang="en-US"/>
           </a:p>
           <a:p>
             <a:pPr lvl="0"/>
             <a:r>
               <a:rPr lang="en-US"/>
-              <a:t>Formalization as a specification recommended</a:t>
-            </a:r>
-            <a:r>
-              <a:rPr lang="en-US" baseline="0"/>
-              <a:t> after</a:t>
-            </a:r>
-            <a:r>
-              <a:rPr lang="en-US"/>
-              <a:t> NIEM 5.0</a:t>
+              <a:t>Update for NIEM 5.0 is recommended.</a:t>
             </a:r>
           </a:p>
         </p:txBody>
@@ -4295,7 +4560,7 @@
     </p:spTree>
     <p:extLst>
       <p:ext uri="{BB962C8B-B14F-4D97-AF65-F5344CB8AC3E}">
-        <p14:creationId xmlns:p14="http://schemas.microsoft.com/office/powerpoint/2010/main" val="2635748564"/>
+        <p14:creationId xmlns:p14="http://schemas.microsoft.com/office/powerpoint/2010/main" val="3955755568"/>
       </p:ext>
     </p:extLst>
   </p:cSld>

</xml_diff>